<commit_message>
code template modified and presention doc added
</commit_message>
<xml_diff>
--- a/paper/pic.pptx
+++ b/paper/pic.pptx
@@ -7,6 +7,11 @@
   <p:sldIdLst>
     <p:sldId id="256" r:id="rId2"/>
     <p:sldId id="257" r:id="rId3"/>
+    <p:sldId id="262" r:id="rId4"/>
+    <p:sldId id="263" r:id="rId5"/>
+    <p:sldId id="261" r:id="rId6"/>
+    <p:sldId id="258" r:id="rId7"/>
+    <p:sldId id="259" r:id="rId8"/>
   </p:sldIdLst>
   <p:sldSz cx="9144000" cy="6858000" type="screen4x3"/>
   <p:notesSz cx="6858000" cy="9144000"/>
@@ -289,7 +294,7 @@
           <a:p>
             <a:fld id="{3FDA3681-DC86-4C42-BA1D-57F9FC92D4D3}" type="datetimeFigureOut">
               <a:rPr lang="zh-CN" altLang="en-US" smtClean="0"/>
-              <a:t>2012/5/3</a:t>
+              <a:t>2012/5/10</a:t>
             </a:fld>
             <a:endParaRPr lang="zh-CN" altLang="en-US"/>
           </a:p>
@@ -459,7 +464,7 @@
           <a:p>
             <a:fld id="{3FDA3681-DC86-4C42-BA1D-57F9FC92D4D3}" type="datetimeFigureOut">
               <a:rPr lang="zh-CN" altLang="en-US" smtClean="0"/>
-              <a:t>2012/5/3</a:t>
+              <a:t>2012/5/10</a:t>
             </a:fld>
             <a:endParaRPr lang="zh-CN" altLang="en-US"/>
           </a:p>
@@ -639,7 +644,7 @@
           <a:p>
             <a:fld id="{3FDA3681-DC86-4C42-BA1D-57F9FC92D4D3}" type="datetimeFigureOut">
               <a:rPr lang="zh-CN" altLang="en-US" smtClean="0"/>
-              <a:t>2012/5/3</a:t>
+              <a:t>2012/5/10</a:t>
             </a:fld>
             <a:endParaRPr lang="zh-CN" altLang="en-US"/>
           </a:p>
@@ -809,7 +814,7 @@
           <a:p>
             <a:fld id="{3FDA3681-DC86-4C42-BA1D-57F9FC92D4D3}" type="datetimeFigureOut">
               <a:rPr lang="zh-CN" altLang="en-US" smtClean="0"/>
-              <a:t>2012/5/3</a:t>
+              <a:t>2012/5/10</a:t>
             </a:fld>
             <a:endParaRPr lang="zh-CN" altLang="en-US"/>
           </a:p>
@@ -1055,7 +1060,7 @@
           <a:p>
             <a:fld id="{3FDA3681-DC86-4C42-BA1D-57F9FC92D4D3}" type="datetimeFigureOut">
               <a:rPr lang="zh-CN" altLang="en-US" smtClean="0"/>
-              <a:t>2012/5/3</a:t>
+              <a:t>2012/5/10</a:t>
             </a:fld>
             <a:endParaRPr lang="zh-CN" altLang="en-US"/>
           </a:p>
@@ -1343,7 +1348,7 @@
           <a:p>
             <a:fld id="{3FDA3681-DC86-4C42-BA1D-57F9FC92D4D3}" type="datetimeFigureOut">
               <a:rPr lang="zh-CN" altLang="en-US" smtClean="0"/>
-              <a:t>2012/5/3</a:t>
+              <a:t>2012/5/10</a:t>
             </a:fld>
             <a:endParaRPr lang="zh-CN" altLang="en-US"/>
           </a:p>
@@ -1765,7 +1770,7 @@
           <a:p>
             <a:fld id="{3FDA3681-DC86-4C42-BA1D-57F9FC92D4D3}" type="datetimeFigureOut">
               <a:rPr lang="zh-CN" altLang="en-US" smtClean="0"/>
-              <a:t>2012/5/3</a:t>
+              <a:t>2012/5/10</a:t>
             </a:fld>
             <a:endParaRPr lang="zh-CN" altLang="en-US"/>
           </a:p>
@@ -1883,7 +1888,7 @@
           <a:p>
             <a:fld id="{3FDA3681-DC86-4C42-BA1D-57F9FC92D4D3}" type="datetimeFigureOut">
               <a:rPr lang="zh-CN" altLang="en-US" smtClean="0"/>
-              <a:t>2012/5/3</a:t>
+              <a:t>2012/5/10</a:t>
             </a:fld>
             <a:endParaRPr lang="zh-CN" altLang="en-US"/>
           </a:p>
@@ -1978,7 +1983,7 @@
           <a:p>
             <a:fld id="{3FDA3681-DC86-4C42-BA1D-57F9FC92D4D3}" type="datetimeFigureOut">
               <a:rPr lang="zh-CN" altLang="en-US" smtClean="0"/>
-              <a:t>2012/5/3</a:t>
+              <a:t>2012/5/10</a:t>
             </a:fld>
             <a:endParaRPr lang="zh-CN" altLang="en-US"/>
           </a:p>
@@ -2255,7 +2260,7 @@
           <a:p>
             <a:fld id="{3FDA3681-DC86-4C42-BA1D-57F9FC92D4D3}" type="datetimeFigureOut">
               <a:rPr lang="zh-CN" altLang="en-US" smtClean="0"/>
-              <a:t>2012/5/3</a:t>
+              <a:t>2012/5/10</a:t>
             </a:fld>
             <a:endParaRPr lang="zh-CN" altLang="en-US"/>
           </a:p>
@@ -2508,7 +2513,7 @@
           <a:p>
             <a:fld id="{3FDA3681-DC86-4C42-BA1D-57F9FC92D4D3}" type="datetimeFigureOut">
               <a:rPr lang="zh-CN" altLang="en-US" smtClean="0"/>
-              <a:t>2012/5/3</a:t>
+              <a:t>2012/5/10</a:t>
             </a:fld>
             <a:endParaRPr lang="zh-CN" altLang="en-US"/>
           </a:p>
@@ -2721,7 +2726,7 @@
           <a:p>
             <a:fld id="{3FDA3681-DC86-4C42-BA1D-57F9FC92D4D3}" type="datetimeFigureOut">
               <a:rPr lang="zh-CN" altLang="en-US" smtClean="0"/>
-              <a:t>2012/5/3</a:t>
+              <a:t>2012/5/10</a:t>
             </a:fld>
             <a:endParaRPr lang="zh-CN" altLang="en-US"/>
           </a:p>
@@ -3737,21 +3742,7 @@
                 <a:latin typeface="微软雅黑" pitchFamily="34" charset="-122"/>
                 <a:ea typeface="微软雅黑" pitchFamily="34" charset="-122"/>
               </a:rPr>
-              <a:t>开</a:t>
-            </a:r>
-            <a:r>
-              <a:rPr lang="zh-CN" altLang="en-US" sz="3600" b="1" dirty="0" smtClean="0">
-                <a:effectLst>
-                  <a:outerShdw blurRad="38100" dist="38100" dir="2700000" algn="tl">
-                    <a:srgbClr val="000000">
-                      <a:alpha val="43137"/>
-                    </a:srgbClr>
-                  </a:outerShdw>
-                </a:effectLst>
-                <a:latin typeface="微软雅黑" pitchFamily="34" charset="-122"/>
-                <a:ea typeface="微软雅黑" pitchFamily="34" charset="-122"/>
-              </a:rPr>
-              <a:t>源站点</a:t>
+              <a:t>开源站点</a:t>
             </a:r>
             <a:endParaRPr lang="zh-CN" altLang="en-US" sz="3600" b="1" dirty="0">
               <a:effectLst>
@@ -3899,6 +3890,2077 @@
     <p:extLst>
       <p:ext uri="{BB962C8B-B14F-4D97-AF65-F5344CB8AC3E}">
         <p14:creationId xmlns:p14="http://schemas.microsoft.com/office/powerpoint/2010/main" val="2804391790"/>
+      </p:ext>
+    </p:extLst>
+  </p:cSld>
+  <p:clrMapOvr>
+    <a:masterClrMapping/>
+  </p:clrMapOvr>
+  <p:timing>
+    <p:tnLst>
+      <p:par>
+        <p:cTn id="1" dur="indefinite" restart="never" nodeType="tmRoot"/>
+      </p:par>
+    </p:tnLst>
+  </p:timing>
+</p:sld>
+</file>
+
+<file path=ppt/slides/slide3.xml><?xml version="1.0" encoding="utf-8"?>
+<p:sld xmlns:a="http://schemas.openxmlformats.org/drawingml/2006/main" xmlns:r="http://schemas.openxmlformats.org/officeDocument/2006/relationships" xmlns:p="http://schemas.openxmlformats.org/presentationml/2006/main">
+  <p:cSld>
+    <p:spTree>
+      <p:nvGrpSpPr>
+        <p:cNvPr id="1" name=""/>
+        <p:cNvGrpSpPr/>
+        <p:nvPr/>
+      </p:nvGrpSpPr>
+      <p:grpSpPr>
+        <a:xfrm>
+          <a:off x="0" y="0"/>
+          <a:ext cx="0" cy="0"/>
+          <a:chOff x="0" y="0"/>
+          <a:chExt cx="0" cy="0"/>
+        </a:xfrm>
+      </p:grpSpPr>
+      <p:sp>
+        <p:nvSpPr>
+          <p:cNvPr id="8" name="云形 7"/>
+          <p:cNvSpPr/>
+          <p:nvPr/>
+        </p:nvSpPr>
+        <p:spPr>
+          <a:xfrm>
+            <a:off x="217849" y="375223"/>
+            <a:ext cx="8746639" cy="5993613"/>
+          </a:xfrm>
+          <a:prstGeom prst="cloud">
+            <a:avLst/>
+          </a:prstGeom>
+        </p:spPr>
+        <p:style>
+          <a:lnRef idx="1">
+            <a:schemeClr val="accent3"/>
+          </a:lnRef>
+          <a:fillRef idx="2">
+            <a:schemeClr val="accent3"/>
+          </a:fillRef>
+          <a:effectRef idx="1">
+            <a:schemeClr val="accent3"/>
+          </a:effectRef>
+          <a:fontRef idx="minor">
+            <a:schemeClr val="dk1"/>
+          </a:fontRef>
+        </p:style>
+        <p:txBody>
+          <a:bodyPr rtlCol="0" anchor="ctr"/>
+          <a:lstStyle/>
+          <a:p>
+            <a:pPr algn="ctr"/>
+            <a:endParaRPr lang="zh-CN" altLang="en-US"/>
+          </a:p>
+        </p:txBody>
+      </p:sp>
+      <p:sp>
+        <p:nvSpPr>
+          <p:cNvPr id="4" name="圆角矩形 3"/>
+          <p:cNvSpPr/>
+          <p:nvPr/>
+        </p:nvSpPr>
+        <p:spPr>
+          <a:xfrm>
+            <a:off x="4572000" y="3583238"/>
+            <a:ext cx="2880320" cy="883151"/>
+          </a:xfrm>
+          <a:prstGeom prst="roundRect">
+            <a:avLst>
+              <a:gd name="adj" fmla="val 50000"/>
+            </a:avLst>
+          </a:prstGeom>
+        </p:spPr>
+        <p:style>
+          <a:lnRef idx="1">
+            <a:schemeClr val="accent2"/>
+          </a:lnRef>
+          <a:fillRef idx="2">
+            <a:schemeClr val="accent2"/>
+          </a:fillRef>
+          <a:effectRef idx="1">
+            <a:schemeClr val="accent2"/>
+          </a:effectRef>
+          <a:fontRef idx="minor">
+            <a:schemeClr val="dk1"/>
+          </a:fontRef>
+        </p:style>
+        <p:txBody>
+          <a:bodyPr rtlCol="0" anchor="ctr"/>
+          <a:lstStyle/>
+          <a:p>
+            <a:pPr algn="ctr"/>
+            <a:r>
+              <a:rPr lang="zh-CN" altLang="en-US" sz="3600" b="1" dirty="0" smtClean="0">
+                <a:effectLst>
+                  <a:outerShdw blurRad="38100" dist="38100" dir="2700000" algn="tl">
+                    <a:srgbClr val="000000">
+                      <a:alpha val="43137"/>
+                    </a:srgbClr>
+                  </a:outerShdw>
+                </a:effectLst>
+                <a:latin typeface="微软雅黑" pitchFamily="34" charset="-122"/>
+                <a:ea typeface="微软雅黑" pitchFamily="34" charset="-122"/>
+              </a:rPr>
+              <a:t>开发套件</a:t>
+            </a:r>
+            <a:endParaRPr lang="zh-CN" altLang="en-US" sz="3600" b="1" dirty="0">
+              <a:effectLst>
+                <a:outerShdw blurRad="38100" dist="38100" dir="2700000" algn="tl">
+                  <a:srgbClr val="000000">
+                    <a:alpha val="43137"/>
+                  </a:srgbClr>
+                </a:outerShdw>
+              </a:effectLst>
+              <a:latin typeface="微软雅黑" pitchFamily="34" charset="-122"/>
+              <a:ea typeface="微软雅黑" pitchFamily="34" charset="-122"/>
+            </a:endParaRPr>
+          </a:p>
+        </p:txBody>
+      </p:sp>
+      <p:sp>
+        <p:nvSpPr>
+          <p:cNvPr id="5" name="圆角矩形 4"/>
+          <p:cNvSpPr/>
+          <p:nvPr/>
+        </p:nvSpPr>
+        <p:spPr>
+          <a:xfrm>
+            <a:off x="5076056" y="1033680"/>
+            <a:ext cx="2880320" cy="883151"/>
+          </a:xfrm>
+          <a:prstGeom prst="roundRect">
+            <a:avLst>
+              <a:gd name="adj" fmla="val 50000"/>
+            </a:avLst>
+          </a:prstGeom>
+        </p:spPr>
+        <p:style>
+          <a:lnRef idx="1">
+            <a:schemeClr val="accent1"/>
+          </a:lnRef>
+          <a:fillRef idx="2">
+            <a:schemeClr val="accent1"/>
+          </a:fillRef>
+          <a:effectRef idx="1">
+            <a:schemeClr val="accent1"/>
+          </a:effectRef>
+          <a:fontRef idx="minor">
+            <a:schemeClr val="dk1"/>
+          </a:fontRef>
+        </p:style>
+        <p:txBody>
+          <a:bodyPr rtlCol="0" anchor="ctr"/>
+          <a:lstStyle/>
+          <a:p>
+            <a:pPr algn="ctr"/>
+            <a:r>
+              <a:rPr lang="zh-CN" altLang="en-US" sz="3600" b="1" dirty="0" smtClean="0">
+                <a:effectLst>
+                  <a:outerShdw blurRad="38100" dist="38100" dir="2700000" algn="tl">
+                    <a:srgbClr val="000000">
+                      <a:alpha val="43137"/>
+                    </a:srgbClr>
+                  </a:outerShdw>
+                </a:effectLst>
+                <a:latin typeface="微软雅黑" pitchFamily="34" charset="-122"/>
+                <a:ea typeface="微软雅黑" pitchFamily="34" charset="-122"/>
+              </a:rPr>
+              <a:t>开源站点</a:t>
+            </a:r>
+            <a:endParaRPr lang="zh-CN" altLang="en-US" sz="3600" b="1" dirty="0">
+              <a:effectLst>
+                <a:outerShdw blurRad="38100" dist="38100" dir="2700000" algn="tl">
+                  <a:srgbClr val="000000">
+                    <a:alpha val="43137"/>
+                  </a:srgbClr>
+                </a:outerShdw>
+              </a:effectLst>
+              <a:latin typeface="微软雅黑" pitchFamily="34" charset="-122"/>
+              <a:ea typeface="微软雅黑" pitchFamily="34" charset="-122"/>
+            </a:endParaRPr>
+          </a:p>
+        </p:txBody>
+      </p:sp>
+      <p:sp>
+        <p:nvSpPr>
+          <p:cNvPr id="6" name="圆角矩形 5"/>
+          <p:cNvSpPr/>
+          <p:nvPr/>
+        </p:nvSpPr>
+        <p:spPr>
+          <a:xfrm>
+            <a:off x="755576" y="2786894"/>
+            <a:ext cx="2880320" cy="883151"/>
+          </a:xfrm>
+          <a:prstGeom prst="roundRect">
+            <a:avLst>
+              <a:gd name="adj" fmla="val 50000"/>
+            </a:avLst>
+          </a:prstGeom>
+        </p:spPr>
+        <p:style>
+          <a:lnRef idx="1">
+            <a:schemeClr val="accent1"/>
+          </a:lnRef>
+          <a:fillRef idx="2">
+            <a:schemeClr val="accent1"/>
+          </a:fillRef>
+          <a:effectRef idx="1">
+            <a:schemeClr val="accent1"/>
+          </a:effectRef>
+          <a:fontRef idx="minor">
+            <a:schemeClr val="dk1"/>
+          </a:fontRef>
+        </p:style>
+        <p:txBody>
+          <a:bodyPr rtlCol="0" anchor="ctr"/>
+          <a:lstStyle/>
+          <a:p>
+            <a:pPr algn="ctr"/>
+            <a:r>
+              <a:rPr lang="zh-CN" altLang="en-US" sz="3600" b="1" dirty="0" smtClean="0">
+                <a:effectLst>
+                  <a:outerShdw blurRad="38100" dist="38100" dir="2700000" algn="tl">
+                    <a:srgbClr val="000000">
+                      <a:alpha val="43137"/>
+                    </a:srgbClr>
+                  </a:outerShdw>
+                </a:effectLst>
+                <a:latin typeface="微软雅黑" pitchFamily="34" charset="-122"/>
+                <a:ea typeface="微软雅黑" pitchFamily="34" charset="-122"/>
+              </a:rPr>
+              <a:t>指导手册</a:t>
+            </a:r>
+            <a:endParaRPr lang="zh-CN" altLang="en-US" sz="3600" b="1" dirty="0">
+              <a:effectLst>
+                <a:outerShdw blurRad="38100" dist="38100" dir="2700000" algn="tl">
+                  <a:srgbClr val="000000">
+                    <a:alpha val="43137"/>
+                  </a:srgbClr>
+                </a:outerShdw>
+              </a:effectLst>
+              <a:latin typeface="微软雅黑" pitchFamily="34" charset="-122"/>
+              <a:ea typeface="微软雅黑" pitchFamily="34" charset="-122"/>
+            </a:endParaRPr>
+          </a:p>
+        </p:txBody>
+      </p:sp>
+      <p:sp>
+        <p:nvSpPr>
+          <p:cNvPr id="9" name="TextBox 8"/>
+          <p:cNvSpPr txBox="1"/>
+          <p:nvPr/>
+        </p:nvSpPr>
+        <p:spPr>
+          <a:xfrm>
+            <a:off x="1043608" y="4437112"/>
+            <a:ext cx="4320480" cy="923330"/>
+          </a:xfrm>
+          <a:prstGeom prst="rect">
+            <a:avLst/>
+          </a:prstGeom>
+          <a:noFill/>
+        </p:spPr>
+        <p:txBody>
+          <a:bodyPr wrap="square" rtlCol="0">
+            <a:spAutoFit/>
+          </a:bodyPr>
+          <a:lstStyle/>
+          <a:p>
+            <a:r>
+              <a:rPr lang="en-US" altLang="zh-CN" sz="5400" b="1" dirty="0" smtClean="0">
+                <a:effectLst>
+                  <a:outerShdw blurRad="38100" dist="38100" dir="2700000" algn="tl">
+                    <a:srgbClr val="000000">
+                      <a:alpha val="43137"/>
+                    </a:srgbClr>
+                  </a:outerShdw>
+                </a:effectLst>
+                <a:latin typeface="方正静蕾简体" pitchFamily="2" charset="-122"/>
+                <a:ea typeface="方正静蕾简体" pitchFamily="2" charset="-122"/>
+              </a:rPr>
+              <a:t>STM8</a:t>
+            </a:r>
+            <a:r>
+              <a:rPr lang="zh-CN" altLang="en-US" sz="5400" b="1" dirty="0" smtClean="0">
+                <a:effectLst>
+                  <a:outerShdw blurRad="38100" dist="38100" dir="2700000" algn="tl">
+                    <a:srgbClr val="000000">
+                      <a:alpha val="43137"/>
+                    </a:srgbClr>
+                  </a:outerShdw>
+                </a:effectLst>
+                <a:latin typeface="方正静蕾简体" pitchFamily="2" charset="-122"/>
+                <a:ea typeface="方正静蕾简体" pitchFamily="2" charset="-122"/>
+              </a:rPr>
+              <a:t>教学平台</a:t>
+            </a:r>
+            <a:endParaRPr lang="zh-CN" altLang="en-US" sz="5400" b="1" dirty="0">
+              <a:effectLst>
+                <a:outerShdw blurRad="38100" dist="38100" dir="2700000" algn="tl">
+                  <a:srgbClr val="000000">
+                    <a:alpha val="43137"/>
+                  </a:srgbClr>
+                </a:outerShdw>
+              </a:effectLst>
+              <a:latin typeface="方正静蕾简体" pitchFamily="2" charset="-122"/>
+              <a:ea typeface="方正静蕾简体" pitchFamily="2" charset="-122"/>
+            </a:endParaRPr>
+          </a:p>
+        </p:txBody>
+      </p:sp>
+    </p:spTree>
+    <p:extLst>
+      <p:ext uri="{BB962C8B-B14F-4D97-AF65-F5344CB8AC3E}">
+        <p14:creationId xmlns:p14="http://schemas.microsoft.com/office/powerpoint/2010/main" val="3746779092"/>
+      </p:ext>
+    </p:extLst>
+  </p:cSld>
+  <p:clrMapOvr>
+    <a:masterClrMapping/>
+  </p:clrMapOvr>
+  <p:timing>
+    <p:tnLst>
+      <p:par>
+        <p:cTn id="1" dur="indefinite" restart="never" nodeType="tmRoot"/>
+      </p:par>
+    </p:tnLst>
+  </p:timing>
+</p:sld>
+</file>
+
+<file path=ppt/slides/slide4.xml><?xml version="1.0" encoding="utf-8"?>
+<p:sld xmlns:a="http://schemas.openxmlformats.org/drawingml/2006/main" xmlns:r="http://schemas.openxmlformats.org/officeDocument/2006/relationships" xmlns:p="http://schemas.openxmlformats.org/presentationml/2006/main">
+  <p:cSld>
+    <p:spTree>
+      <p:nvGrpSpPr>
+        <p:cNvPr id="1" name=""/>
+        <p:cNvGrpSpPr/>
+        <p:nvPr/>
+      </p:nvGrpSpPr>
+      <p:grpSpPr>
+        <a:xfrm>
+          <a:off x="0" y="0"/>
+          <a:ext cx="0" cy="0"/>
+          <a:chOff x="0" y="0"/>
+          <a:chExt cx="0" cy="0"/>
+        </a:xfrm>
+      </p:grpSpPr>
+      <p:sp>
+        <p:nvSpPr>
+          <p:cNvPr id="8" name="云形 7"/>
+          <p:cNvSpPr/>
+          <p:nvPr/>
+        </p:nvSpPr>
+        <p:spPr>
+          <a:xfrm>
+            <a:off x="217849" y="375223"/>
+            <a:ext cx="8746639" cy="5993613"/>
+          </a:xfrm>
+          <a:prstGeom prst="cloud">
+            <a:avLst/>
+          </a:prstGeom>
+        </p:spPr>
+        <p:style>
+          <a:lnRef idx="1">
+            <a:schemeClr val="accent3"/>
+          </a:lnRef>
+          <a:fillRef idx="2">
+            <a:schemeClr val="accent3"/>
+          </a:fillRef>
+          <a:effectRef idx="1">
+            <a:schemeClr val="accent3"/>
+          </a:effectRef>
+          <a:fontRef idx="minor">
+            <a:schemeClr val="dk1"/>
+          </a:fontRef>
+        </p:style>
+        <p:txBody>
+          <a:bodyPr rtlCol="0" anchor="ctr"/>
+          <a:lstStyle/>
+          <a:p>
+            <a:pPr algn="ctr"/>
+            <a:endParaRPr lang="zh-CN" altLang="en-US"/>
+          </a:p>
+        </p:txBody>
+      </p:sp>
+      <p:sp>
+        <p:nvSpPr>
+          <p:cNvPr id="4" name="圆角矩形 3"/>
+          <p:cNvSpPr/>
+          <p:nvPr/>
+        </p:nvSpPr>
+        <p:spPr>
+          <a:xfrm>
+            <a:off x="4572000" y="3583238"/>
+            <a:ext cx="2880320" cy="883151"/>
+          </a:xfrm>
+          <a:prstGeom prst="roundRect">
+            <a:avLst>
+              <a:gd name="adj" fmla="val 50000"/>
+            </a:avLst>
+          </a:prstGeom>
+        </p:spPr>
+        <p:style>
+          <a:lnRef idx="1">
+            <a:schemeClr val="accent2"/>
+          </a:lnRef>
+          <a:fillRef idx="2">
+            <a:schemeClr val="accent2"/>
+          </a:fillRef>
+          <a:effectRef idx="1">
+            <a:schemeClr val="accent2"/>
+          </a:effectRef>
+          <a:fontRef idx="minor">
+            <a:schemeClr val="dk1"/>
+          </a:fontRef>
+        </p:style>
+        <p:txBody>
+          <a:bodyPr rtlCol="0" anchor="ctr"/>
+          <a:lstStyle/>
+          <a:p>
+            <a:pPr algn="ctr"/>
+            <a:r>
+              <a:rPr lang="zh-CN" altLang="en-US" sz="3600" b="1" dirty="0" smtClean="0">
+                <a:effectLst>
+                  <a:outerShdw blurRad="38100" dist="38100" dir="2700000" algn="tl">
+                    <a:srgbClr val="000000">
+                      <a:alpha val="43137"/>
+                    </a:srgbClr>
+                  </a:outerShdw>
+                </a:effectLst>
+                <a:latin typeface="微软雅黑" pitchFamily="34" charset="-122"/>
+                <a:ea typeface="微软雅黑" pitchFamily="34" charset="-122"/>
+              </a:rPr>
+              <a:t>开发套件</a:t>
+            </a:r>
+            <a:endParaRPr lang="zh-CN" altLang="en-US" sz="3600" b="1" dirty="0">
+              <a:effectLst>
+                <a:outerShdw blurRad="38100" dist="38100" dir="2700000" algn="tl">
+                  <a:srgbClr val="000000">
+                    <a:alpha val="43137"/>
+                  </a:srgbClr>
+                </a:outerShdw>
+              </a:effectLst>
+              <a:latin typeface="微软雅黑" pitchFamily="34" charset="-122"/>
+              <a:ea typeface="微软雅黑" pitchFamily="34" charset="-122"/>
+            </a:endParaRPr>
+          </a:p>
+        </p:txBody>
+      </p:sp>
+      <p:sp>
+        <p:nvSpPr>
+          <p:cNvPr id="5" name="圆角矩形 4"/>
+          <p:cNvSpPr/>
+          <p:nvPr/>
+        </p:nvSpPr>
+        <p:spPr>
+          <a:xfrm>
+            <a:off x="5076056" y="1033680"/>
+            <a:ext cx="2880320" cy="883151"/>
+          </a:xfrm>
+          <a:prstGeom prst="roundRect">
+            <a:avLst>
+              <a:gd name="adj" fmla="val 50000"/>
+            </a:avLst>
+          </a:prstGeom>
+        </p:spPr>
+        <p:style>
+          <a:lnRef idx="1">
+            <a:schemeClr val="accent2"/>
+          </a:lnRef>
+          <a:fillRef idx="2">
+            <a:schemeClr val="accent2"/>
+          </a:fillRef>
+          <a:effectRef idx="1">
+            <a:schemeClr val="accent2"/>
+          </a:effectRef>
+          <a:fontRef idx="minor">
+            <a:schemeClr val="dk1"/>
+          </a:fontRef>
+        </p:style>
+        <p:txBody>
+          <a:bodyPr rtlCol="0" anchor="ctr"/>
+          <a:lstStyle/>
+          <a:p>
+            <a:pPr algn="ctr"/>
+            <a:r>
+              <a:rPr lang="zh-CN" altLang="en-US" sz="3600" b="1" dirty="0" smtClean="0">
+                <a:effectLst>
+                  <a:outerShdw blurRad="38100" dist="38100" dir="2700000" algn="tl">
+                    <a:srgbClr val="000000">
+                      <a:alpha val="43137"/>
+                    </a:srgbClr>
+                  </a:outerShdw>
+                </a:effectLst>
+                <a:latin typeface="微软雅黑" pitchFamily="34" charset="-122"/>
+                <a:ea typeface="微软雅黑" pitchFamily="34" charset="-122"/>
+              </a:rPr>
+              <a:t>开源站点</a:t>
+            </a:r>
+            <a:endParaRPr lang="zh-CN" altLang="en-US" sz="3600" b="1" dirty="0">
+              <a:effectLst>
+                <a:outerShdw blurRad="38100" dist="38100" dir="2700000" algn="tl">
+                  <a:srgbClr val="000000">
+                    <a:alpha val="43137"/>
+                  </a:srgbClr>
+                </a:outerShdw>
+              </a:effectLst>
+              <a:latin typeface="微软雅黑" pitchFamily="34" charset="-122"/>
+              <a:ea typeface="微软雅黑" pitchFamily="34" charset="-122"/>
+            </a:endParaRPr>
+          </a:p>
+        </p:txBody>
+      </p:sp>
+      <p:sp>
+        <p:nvSpPr>
+          <p:cNvPr id="6" name="圆角矩形 5"/>
+          <p:cNvSpPr/>
+          <p:nvPr/>
+        </p:nvSpPr>
+        <p:spPr>
+          <a:xfrm>
+            <a:off x="755576" y="2786894"/>
+            <a:ext cx="2880320" cy="883151"/>
+          </a:xfrm>
+          <a:prstGeom prst="roundRect">
+            <a:avLst>
+              <a:gd name="adj" fmla="val 50000"/>
+            </a:avLst>
+          </a:prstGeom>
+        </p:spPr>
+        <p:style>
+          <a:lnRef idx="1">
+            <a:schemeClr val="accent1"/>
+          </a:lnRef>
+          <a:fillRef idx="2">
+            <a:schemeClr val="accent1"/>
+          </a:fillRef>
+          <a:effectRef idx="1">
+            <a:schemeClr val="accent1"/>
+          </a:effectRef>
+          <a:fontRef idx="minor">
+            <a:schemeClr val="dk1"/>
+          </a:fontRef>
+        </p:style>
+        <p:txBody>
+          <a:bodyPr rtlCol="0" anchor="ctr"/>
+          <a:lstStyle/>
+          <a:p>
+            <a:pPr algn="ctr"/>
+            <a:r>
+              <a:rPr lang="zh-CN" altLang="en-US" sz="3600" b="1" dirty="0" smtClean="0">
+                <a:effectLst>
+                  <a:outerShdw blurRad="38100" dist="38100" dir="2700000" algn="tl">
+                    <a:srgbClr val="000000">
+                      <a:alpha val="43137"/>
+                    </a:srgbClr>
+                  </a:outerShdw>
+                </a:effectLst>
+                <a:latin typeface="微软雅黑" pitchFamily="34" charset="-122"/>
+                <a:ea typeface="微软雅黑" pitchFamily="34" charset="-122"/>
+              </a:rPr>
+              <a:t>指导手册</a:t>
+            </a:r>
+            <a:endParaRPr lang="zh-CN" altLang="en-US" sz="3600" b="1" dirty="0">
+              <a:effectLst>
+                <a:outerShdw blurRad="38100" dist="38100" dir="2700000" algn="tl">
+                  <a:srgbClr val="000000">
+                    <a:alpha val="43137"/>
+                  </a:srgbClr>
+                </a:outerShdw>
+              </a:effectLst>
+              <a:latin typeface="微软雅黑" pitchFamily="34" charset="-122"/>
+              <a:ea typeface="微软雅黑" pitchFamily="34" charset="-122"/>
+            </a:endParaRPr>
+          </a:p>
+        </p:txBody>
+      </p:sp>
+      <p:sp>
+        <p:nvSpPr>
+          <p:cNvPr id="9" name="TextBox 8"/>
+          <p:cNvSpPr txBox="1"/>
+          <p:nvPr/>
+        </p:nvSpPr>
+        <p:spPr>
+          <a:xfrm>
+            <a:off x="1043608" y="4437112"/>
+            <a:ext cx="4320480" cy="923330"/>
+          </a:xfrm>
+          <a:prstGeom prst="rect">
+            <a:avLst/>
+          </a:prstGeom>
+          <a:noFill/>
+        </p:spPr>
+        <p:txBody>
+          <a:bodyPr wrap="square" rtlCol="0">
+            <a:spAutoFit/>
+          </a:bodyPr>
+          <a:lstStyle/>
+          <a:p>
+            <a:r>
+              <a:rPr lang="en-US" altLang="zh-CN" sz="5400" b="1" dirty="0" smtClean="0">
+                <a:effectLst>
+                  <a:outerShdw blurRad="38100" dist="38100" dir="2700000" algn="tl">
+                    <a:srgbClr val="000000">
+                      <a:alpha val="43137"/>
+                    </a:srgbClr>
+                  </a:outerShdw>
+                </a:effectLst>
+                <a:latin typeface="方正静蕾简体" pitchFamily="2" charset="-122"/>
+                <a:ea typeface="方正静蕾简体" pitchFamily="2" charset="-122"/>
+              </a:rPr>
+              <a:t>STM8</a:t>
+            </a:r>
+            <a:r>
+              <a:rPr lang="zh-CN" altLang="en-US" sz="5400" b="1" dirty="0" smtClean="0">
+                <a:effectLst>
+                  <a:outerShdw blurRad="38100" dist="38100" dir="2700000" algn="tl">
+                    <a:srgbClr val="000000">
+                      <a:alpha val="43137"/>
+                    </a:srgbClr>
+                  </a:outerShdw>
+                </a:effectLst>
+                <a:latin typeface="方正静蕾简体" pitchFamily="2" charset="-122"/>
+                <a:ea typeface="方正静蕾简体" pitchFamily="2" charset="-122"/>
+              </a:rPr>
+              <a:t>教学平台</a:t>
+            </a:r>
+            <a:endParaRPr lang="zh-CN" altLang="en-US" sz="5400" b="1" dirty="0">
+              <a:effectLst>
+                <a:outerShdw blurRad="38100" dist="38100" dir="2700000" algn="tl">
+                  <a:srgbClr val="000000">
+                    <a:alpha val="43137"/>
+                  </a:srgbClr>
+                </a:outerShdw>
+              </a:effectLst>
+              <a:latin typeface="方正静蕾简体" pitchFamily="2" charset="-122"/>
+              <a:ea typeface="方正静蕾简体" pitchFamily="2" charset="-122"/>
+            </a:endParaRPr>
+          </a:p>
+        </p:txBody>
+      </p:sp>
+    </p:spTree>
+    <p:extLst>
+      <p:ext uri="{BB962C8B-B14F-4D97-AF65-F5344CB8AC3E}">
+        <p14:creationId xmlns:p14="http://schemas.microsoft.com/office/powerpoint/2010/main" val="2969327412"/>
+      </p:ext>
+    </p:extLst>
+  </p:cSld>
+  <p:clrMapOvr>
+    <a:masterClrMapping/>
+  </p:clrMapOvr>
+  <p:timing>
+    <p:tnLst>
+      <p:par>
+        <p:cTn id="1" dur="indefinite" restart="never" nodeType="tmRoot"/>
+      </p:par>
+    </p:tnLst>
+  </p:timing>
+</p:sld>
+</file>
+
+<file path=ppt/slides/slide5.xml><?xml version="1.0" encoding="utf-8"?>
+<p:sld xmlns:a="http://schemas.openxmlformats.org/drawingml/2006/main" xmlns:r="http://schemas.openxmlformats.org/officeDocument/2006/relationships" xmlns:p="http://schemas.openxmlformats.org/presentationml/2006/main">
+  <p:cSld>
+    <p:spTree>
+      <p:nvGrpSpPr>
+        <p:cNvPr id="1" name=""/>
+        <p:cNvGrpSpPr/>
+        <p:nvPr/>
+      </p:nvGrpSpPr>
+      <p:grpSpPr>
+        <a:xfrm>
+          <a:off x="0" y="0"/>
+          <a:ext cx="0" cy="0"/>
+          <a:chOff x="0" y="0"/>
+          <a:chExt cx="0" cy="0"/>
+        </a:xfrm>
+      </p:grpSpPr>
+      <p:sp>
+        <p:nvSpPr>
+          <p:cNvPr id="8" name="云形 7"/>
+          <p:cNvSpPr/>
+          <p:nvPr/>
+        </p:nvSpPr>
+        <p:spPr>
+          <a:xfrm>
+            <a:off x="217849" y="375223"/>
+            <a:ext cx="8746639" cy="5993613"/>
+          </a:xfrm>
+          <a:prstGeom prst="cloud">
+            <a:avLst/>
+          </a:prstGeom>
+        </p:spPr>
+        <p:style>
+          <a:lnRef idx="1">
+            <a:schemeClr val="accent3"/>
+          </a:lnRef>
+          <a:fillRef idx="2">
+            <a:schemeClr val="accent3"/>
+          </a:fillRef>
+          <a:effectRef idx="1">
+            <a:schemeClr val="accent3"/>
+          </a:effectRef>
+          <a:fontRef idx="minor">
+            <a:schemeClr val="dk1"/>
+          </a:fontRef>
+        </p:style>
+        <p:txBody>
+          <a:bodyPr rtlCol="0" anchor="ctr"/>
+          <a:lstStyle/>
+          <a:p>
+            <a:pPr algn="ctr"/>
+            <a:endParaRPr lang="zh-CN" altLang="en-US"/>
+          </a:p>
+        </p:txBody>
+      </p:sp>
+      <p:sp>
+        <p:nvSpPr>
+          <p:cNvPr id="4" name="圆角矩形 3"/>
+          <p:cNvSpPr/>
+          <p:nvPr/>
+        </p:nvSpPr>
+        <p:spPr>
+          <a:xfrm>
+            <a:off x="4572000" y="3583238"/>
+            <a:ext cx="2880320" cy="883151"/>
+          </a:xfrm>
+          <a:prstGeom prst="roundRect">
+            <a:avLst>
+              <a:gd name="adj" fmla="val 50000"/>
+            </a:avLst>
+          </a:prstGeom>
+        </p:spPr>
+        <p:style>
+          <a:lnRef idx="1">
+            <a:schemeClr val="accent2"/>
+          </a:lnRef>
+          <a:fillRef idx="2">
+            <a:schemeClr val="accent2"/>
+          </a:fillRef>
+          <a:effectRef idx="1">
+            <a:schemeClr val="accent2"/>
+          </a:effectRef>
+          <a:fontRef idx="minor">
+            <a:schemeClr val="dk1"/>
+          </a:fontRef>
+        </p:style>
+        <p:txBody>
+          <a:bodyPr rtlCol="0" anchor="ctr"/>
+          <a:lstStyle/>
+          <a:p>
+            <a:pPr algn="ctr"/>
+            <a:r>
+              <a:rPr lang="zh-CN" altLang="en-US" sz="3600" b="1" dirty="0" smtClean="0">
+                <a:effectLst>
+                  <a:outerShdw blurRad="38100" dist="38100" dir="2700000" algn="tl">
+                    <a:srgbClr val="000000">
+                      <a:alpha val="43137"/>
+                    </a:srgbClr>
+                  </a:outerShdw>
+                </a:effectLst>
+                <a:latin typeface="微软雅黑" pitchFamily="34" charset="-122"/>
+                <a:ea typeface="微软雅黑" pitchFamily="34" charset="-122"/>
+              </a:rPr>
+              <a:t>开发套件</a:t>
+            </a:r>
+            <a:endParaRPr lang="zh-CN" altLang="en-US" sz="3600" b="1" dirty="0">
+              <a:effectLst>
+                <a:outerShdw blurRad="38100" dist="38100" dir="2700000" algn="tl">
+                  <a:srgbClr val="000000">
+                    <a:alpha val="43137"/>
+                  </a:srgbClr>
+                </a:outerShdw>
+              </a:effectLst>
+              <a:latin typeface="微软雅黑" pitchFamily="34" charset="-122"/>
+              <a:ea typeface="微软雅黑" pitchFamily="34" charset="-122"/>
+            </a:endParaRPr>
+          </a:p>
+        </p:txBody>
+      </p:sp>
+      <p:sp>
+        <p:nvSpPr>
+          <p:cNvPr id="5" name="圆角矩形 4"/>
+          <p:cNvSpPr/>
+          <p:nvPr/>
+        </p:nvSpPr>
+        <p:spPr>
+          <a:xfrm>
+            <a:off x="5076056" y="1033680"/>
+            <a:ext cx="2880320" cy="883151"/>
+          </a:xfrm>
+          <a:prstGeom prst="roundRect">
+            <a:avLst>
+              <a:gd name="adj" fmla="val 50000"/>
+            </a:avLst>
+          </a:prstGeom>
+        </p:spPr>
+        <p:style>
+          <a:lnRef idx="1">
+            <a:schemeClr val="accent2"/>
+          </a:lnRef>
+          <a:fillRef idx="2">
+            <a:schemeClr val="accent2"/>
+          </a:fillRef>
+          <a:effectRef idx="1">
+            <a:schemeClr val="accent2"/>
+          </a:effectRef>
+          <a:fontRef idx="minor">
+            <a:schemeClr val="dk1"/>
+          </a:fontRef>
+        </p:style>
+        <p:txBody>
+          <a:bodyPr rtlCol="0" anchor="ctr"/>
+          <a:lstStyle/>
+          <a:p>
+            <a:pPr algn="ctr"/>
+            <a:r>
+              <a:rPr lang="zh-CN" altLang="en-US" sz="3600" b="1" dirty="0" smtClean="0">
+                <a:effectLst>
+                  <a:outerShdw blurRad="38100" dist="38100" dir="2700000" algn="tl">
+                    <a:srgbClr val="000000">
+                      <a:alpha val="43137"/>
+                    </a:srgbClr>
+                  </a:outerShdw>
+                </a:effectLst>
+                <a:latin typeface="微软雅黑" pitchFamily="34" charset="-122"/>
+                <a:ea typeface="微软雅黑" pitchFamily="34" charset="-122"/>
+              </a:rPr>
+              <a:t>开源站点</a:t>
+            </a:r>
+            <a:endParaRPr lang="zh-CN" altLang="en-US" sz="3600" b="1" dirty="0">
+              <a:effectLst>
+                <a:outerShdw blurRad="38100" dist="38100" dir="2700000" algn="tl">
+                  <a:srgbClr val="000000">
+                    <a:alpha val="43137"/>
+                  </a:srgbClr>
+                </a:outerShdw>
+              </a:effectLst>
+              <a:latin typeface="微软雅黑" pitchFamily="34" charset="-122"/>
+              <a:ea typeface="微软雅黑" pitchFamily="34" charset="-122"/>
+            </a:endParaRPr>
+          </a:p>
+        </p:txBody>
+      </p:sp>
+      <p:sp>
+        <p:nvSpPr>
+          <p:cNvPr id="6" name="圆角矩形 5"/>
+          <p:cNvSpPr/>
+          <p:nvPr/>
+        </p:nvSpPr>
+        <p:spPr>
+          <a:xfrm>
+            <a:off x="755576" y="2786894"/>
+            <a:ext cx="2880320" cy="883151"/>
+          </a:xfrm>
+          <a:prstGeom prst="roundRect">
+            <a:avLst>
+              <a:gd name="adj" fmla="val 50000"/>
+            </a:avLst>
+          </a:prstGeom>
+        </p:spPr>
+        <p:style>
+          <a:lnRef idx="1">
+            <a:schemeClr val="accent2"/>
+          </a:lnRef>
+          <a:fillRef idx="2">
+            <a:schemeClr val="accent2"/>
+          </a:fillRef>
+          <a:effectRef idx="1">
+            <a:schemeClr val="accent2"/>
+          </a:effectRef>
+          <a:fontRef idx="minor">
+            <a:schemeClr val="dk1"/>
+          </a:fontRef>
+        </p:style>
+        <p:txBody>
+          <a:bodyPr rtlCol="0" anchor="ctr"/>
+          <a:lstStyle/>
+          <a:p>
+            <a:pPr algn="ctr"/>
+            <a:r>
+              <a:rPr lang="zh-CN" altLang="en-US" sz="3600" b="1" dirty="0" smtClean="0">
+                <a:effectLst>
+                  <a:outerShdw blurRad="38100" dist="38100" dir="2700000" algn="tl">
+                    <a:srgbClr val="000000">
+                      <a:alpha val="43137"/>
+                    </a:srgbClr>
+                  </a:outerShdw>
+                </a:effectLst>
+                <a:latin typeface="微软雅黑" pitchFamily="34" charset="-122"/>
+                <a:ea typeface="微软雅黑" pitchFamily="34" charset="-122"/>
+              </a:rPr>
+              <a:t>指导手册</a:t>
+            </a:r>
+            <a:endParaRPr lang="zh-CN" altLang="en-US" sz="3600" b="1" dirty="0">
+              <a:effectLst>
+                <a:outerShdw blurRad="38100" dist="38100" dir="2700000" algn="tl">
+                  <a:srgbClr val="000000">
+                    <a:alpha val="43137"/>
+                  </a:srgbClr>
+                </a:outerShdw>
+              </a:effectLst>
+              <a:latin typeface="微软雅黑" pitchFamily="34" charset="-122"/>
+              <a:ea typeface="微软雅黑" pitchFamily="34" charset="-122"/>
+            </a:endParaRPr>
+          </a:p>
+        </p:txBody>
+      </p:sp>
+      <p:sp>
+        <p:nvSpPr>
+          <p:cNvPr id="9" name="TextBox 8"/>
+          <p:cNvSpPr txBox="1"/>
+          <p:nvPr/>
+        </p:nvSpPr>
+        <p:spPr>
+          <a:xfrm>
+            <a:off x="1043608" y="4437112"/>
+            <a:ext cx="4320480" cy="923330"/>
+          </a:xfrm>
+          <a:prstGeom prst="rect">
+            <a:avLst/>
+          </a:prstGeom>
+          <a:noFill/>
+        </p:spPr>
+        <p:txBody>
+          <a:bodyPr wrap="square" rtlCol="0">
+            <a:spAutoFit/>
+          </a:bodyPr>
+          <a:lstStyle/>
+          <a:p>
+            <a:r>
+              <a:rPr lang="en-US" altLang="zh-CN" sz="5400" b="1" dirty="0" smtClean="0">
+                <a:effectLst>
+                  <a:outerShdw blurRad="38100" dist="38100" dir="2700000" algn="tl">
+                    <a:srgbClr val="000000">
+                      <a:alpha val="43137"/>
+                    </a:srgbClr>
+                  </a:outerShdw>
+                </a:effectLst>
+                <a:latin typeface="方正静蕾简体" pitchFamily="2" charset="-122"/>
+                <a:ea typeface="方正静蕾简体" pitchFamily="2" charset="-122"/>
+              </a:rPr>
+              <a:t>STM8</a:t>
+            </a:r>
+            <a:r>
+              <a:rPr lang="zh-CN" altLang="en-US" sz="5400" b="1" dirty="0" smtClean="0">
+                <a:effectLst>
+                  <a:outerShdw blurRad="38100" dist="38100" dir="2700000" algn="tl">
+                    <a:srgbClr val="000000">
+                      <a:alpha val="43137"/>
+                    </a:srgbClr>
+                  </a:outerShdw>
+                </a:effectLst>
+                <a:latin typeface="方正静蕾简体" pitchFamily="2" charset="-122"/>
+                <a:ea typeface="方正静蕾简体" pitchFamily="2" charset="-122"/>
+              </a:rPr>
+              <a:t>教学平台</a:t>
+            </a:r>
+            <a:endParaRPr lang="zh-CN" altLang="en-US" sz="5400" b="1" dirty="0">
+              <a:effectLst>
+                <a:outerShdw blurRad="38100" dist="38100" dir="2700000" algn="tl">
+                  <a:srgbClr val="000000">
+                    <a:alpha val="43137"/>
+                  </a:srgbClr>
+                </a:outerShdw>
+              </a:effectLst>
+              <a:latin typeface="方正静蕾简体" pitchFamily="2" charset="-122"/>
+              <a:ea typeface="方正静蕾简体" pitchFamily="2" charset="-122"/>
+            </a:endParaRPr>
+          </a:p>
+        </p:txBody>
+      </p:sp>
+    </p:spTree>
+    <p:extLst>
+      <p:ext uri="{BB962C8B-B14F-4D97-AF65-F5344CB8AC3E}">
+        <p14:creationId xmlns:p14="http://schemas.microsoft.com/office/powerpoint/2010/main" val="135078105"/>
+      </p:ext>
+    </p:extLst>
+  </p:cSld>
+  <p:clrMapOvr>
+    <a:masterClrMapping/>
+  </p:clrMapOvr>
+  <p:timing>
+    <p:tnLst>
+      <p:par>
+        <p:cTn id="1" dur="indefinite" restart="never" nodeType="tmRoot"/>
+      </p:par>
+    </p:tnLst>
+  </p:timing>
+</p:sld>
+</file>
+
+<file path=ppt/slides/slide6.xml><?xml version="1.0" encoding="utf-8"?>
+<p:sld xmlns:a="http://schemas.openxmlformats.org/drawingml/2006/main" xmlns:r="http://schemas.openxmlformats.org/officeDocument/2006/relationships" xmlns:p="http://schemas.openxmlformats.org/presentationml/2006/main">
+  <p:cSld>
+    <p:spTree>
+      <p:nvGrpSpPr>
+        <p:cNvPr id="1" name=""/>
+        <p:cNvGrpSpPr/>
+        <p:nvPr/>
+      </p:nvGrpSpPr>
+      <p:grpSpPr>
+        <a:xfrm>
+          <a:off x="0" y="0"/>
+          <a:ext cx="0" cy="0"/>
+          <a:chOff x="0" y="0"/>
+          <a:chExt cx="0" cy="0"/>
+        </a:xfrm>
+      </p:grpSpPr>
+      <p:sp>
+        <p:nvSpPr>
+          <p:cNvPr id="4" name="圆角矩形 3"/>
+          <p:cNvSpPr/>
+          <p:nvPr/>
+        </p:nvSpPr>
+        <p:spPr>
+          <a:xfrm>
+            <a:off x="2824572" y="2470150"/>
+            <a:ext cx="2448272" cy="2108561"/>
+          </a:xfrm>
+          <a:prstGeom prst="roundRect">
+            <a:avLst>
+              <a:gd name="adj" fmla="val 0"/>
+            </a:avLst>
+          </a:prstGeom>
+        </p:spPr>
+        <p:style>
+          <a:lnRef idx="1">
+            <a:schemeClr val="accent1"/>
+          </a:lnRef>
+          <a:fillRef idx="2">
+            <a:schemeClr val="accent1"/>
+          </a:fillRef>
+          <a:effectRef idx="1">
+            <a:schemeClr val="accent1"/>
+          </a:effectRef>
+          <a:fontRef idx="minor">
+            <a:schemeClr val="dk1"/>
+          </a:fontRef>
+        </p:style>
+        <p:txBody>
+          <a:bodyPr rtlCol="0" anchor="ctr"/>
+          <a:lstStyle/>
+          <a:p>
+            <a:pPr algn="ctr"/>
+            <a:r>
+              <a:rPr lang="en-US" altLang="zh-CN" sz="4800" b="1" dirty="0" smtClean="0">
+                <a:effectLst>
+                  <a:outerShdw blurRad="38100" dist="38100" dir="2700000" algn="tl">
+                    <a:srgbClr val="000000">
+                      <a:alpha val="43137"/>
+                    </a:srgbClr>
+                  </a:outerShdw>
+                </a:effectLst>
+              </a:rPr>
+              <a:t>MCU</a:t>
+            </a:r>
+          </a:p>
+          <a:p>
+            <a:pPr algn="ctr"/>
+            <a:r>
+              <a:rPr lang="en-US" altLang="zh-CN" b="1" dirty="0" smtClean="0">
+                <a:effectLst>
+                  <a:outerShdw blurRad="38100" dist="38100" dir="2700000" algn="tl">
+                    <a:srgbClr val="000000">
+                      <a:alpha val="43137"/>
+                    </a:srgbClr>
+                  </a:outerShdw>
+                </a:effectLst>
+              </a:rPr>
+              <a:t>STM8S208MB</a:t>
+            </a:r>
+            <a:endParaRPr lang="zh-CN" altLang="en-US" b="1" dirty="0">
+              <a:effectLst>
+                <a:outerShdw blurRad="38100" dist="38100" dir="2700000" algn="tl">
+                  <a:srgbClr val="000000">
+                    <a:alpha val="43137"/>
+                  </a:srgbClr>
+                </a:outerShdw>
+              </a:effectLst>
+            </a:endParaRPr>
+          </a:p>
+        </p:txBody>
+      </p:sp>
+      <p:sp>
+        <p:nvSpPr>
+          <p:cNvPr id="5" name="圆角矩形 4"/>
+          <p:cNvSpPr/>
+          <p:nvPr/>
+        </p:nvSpPr>
+        <p:spPr>
+          <a:xfrm>
+            <a:off x="2339752" y="404664"/>
+            <a:ext cx="3240360" cy="1296144"/>
+          </a:xfrm>
+          <a:prstGeom prst="roundRect">
+            <a:avLst>
+              <a:gd name="adj" fmla="val 24636"/>
+            </a:avLst>
+          </a:prstGeom>
+        </p:spPr>
+        <p:style>
+          <a:lnRef idx="1">
+            <a:schemeClr val="accent2"/>
+          </a:lnRef>
+          <a:fillRef idx="2">
+            <a:schemeClr val="accent2"/>
+          </a:fillRef>
+          <a:effectRef idx="1">
+            <a:schemeClr val="accent2"/>
+          </a:effectRef>
+          <a:fontRef idx="minor">
+            <a:schemeClr val="dk1"/>
+          </a:fontRef>
+        </p:style>
+        <p:txBody>
+          <a:bodyPr rtlCol="0" anchor="ctr"/>
+          <a:lstStyle/>
+          <a:p>
+            <a:pPr algn="ctr"/>
+            <a:r>
+              <a:rPr lang="en-US" altLang="zh-CN" sz="4800" b="1" dirty="0" smtClean="0">
+                <a:effectLst>
+                  <a:outerShdw blurRad="38100" dist="38100" dir="2700000" algn="tl">
+                    <a:srgbClr val="000000">
+                      <a:alpha val="43137"/>
+                    </a:srgbClr>
+                  </a:outerShdw>
+                </a:effectLst>
+              </a:rPr>
+              <a:t>12864</a:t>
+            </a:r>
+            <a:endParaRPr lang="zh-CN" altLang="en-US" sz="4800" b="1" dirty="0">
+              <a:effectLst>
+                <a:outerShdw blurRad="38100" dist="38100" dir="2700000" algn="tl">
+                  <a:srgbClr val="000000">
+                    <a:alpha val="43137"/>
+                  </a:srgbClr>
+                </a:outerShdw>
+              </a:effectLst>
+            </a:endParaRPr>
+          </a:p>
+        </p:txBody>
+      </p:sp>
+      <p:sp>
+        <p:nvSpPr>
+          <p:cNvPr id="6" name="圆角矩形 5"/>
+          <p:cNvSpPr/>
+          <p:nvPr/>
+        </p:nvSpPr>
+        <p:spPr>
+          <a:xfrm>
+            <a:off x="1547664" y="2348880"/>
+            <a:ext cx="485034" cy="1907236"/>
+          </a:xfrm>
+          <a:prstGeom prst="roundRect">
+            <a:avLst>
+              <a:gd name="adj" fmla="val 38902"/>
+            </a:avLst>
+          </a:prstGeom>
+        </p:spPr>
+        <p:style>
+          <a:lnRef idx="1">
+            <a:schemeClr val="dk1"/>
+          </a:lnRef>
+          <a:fillRef idx="2">
+            <a:schemeClr val="dk1"/>
+          </a:fillRef>
+          <a:effectRef idx="1">
+            <a:schemeClr val="dk1"/>
+          </a:effectRef>
+          <a:fontRef idx="minor">
+            <a:schemeClr val="dk1"/>
+          </a:fontRef>
+        </p:style>
+        <p:txBody>
+          <a:bodyPr rtlCol="0" anchor="ctr"/>
+          <a:lstStyle/>
+          <a:p>
+            <a:pPr algn="ctr"/>
+            <a:r>
+              <a:rPr lang="zh-CN" altLang="en-US" b="1" dirty="0" smtClean="0">
+                <a:effectLst>
+                  <a:outerShdw blurRad="38100" dist="38100" dir="2700000" algn="tl">
+                    <a:srgbClr val="000000">
+                      <a:alpha val="43137"/>
+                    </a:srgbClr>
+                  </a:outerShdw>
+                </a:effectLst>
+              </a:rPr>
+              <a:t>按</a:t>
+            </a:r>
+            <a:endParaRPr lang="en-US" altLang="zh-CN" b="1" dirty="0" smtClean="0">
+              <a:effectLst>
+                <a:outerShdw blurRad="38100" dist="38100" dir="2700000" algn="tl">
+                  <a:srgbClr val="000000">
+                    <a:alpha val="43137"/>
+                  </a:srgbClr>
+                </a:outerShdw>
+              </a:effectLst>
+            </a:endParaRPr>
+          </a:p>
+          <a:p>
+            <a:pPr algn="ctr"/>
+            <a:r>
+              <a:rPr lang="zh-CN" altLang="en-US" b="1" dirty="0" smtClean="0">
+                <a:effectLst>
+                  <a:outerShdw blurRad="38100" dist="38100" dir="2700000" algn="tl">
+                    <a:srgbClr val="000000">
+                      <a:alpha val="43137"/>
+                    </a:srgbClr>
+                  </a:outerShdw>
+                </a:effectLst>
+              </a:rPr>
+              <a:t>键</a:t>
+            </a:r>
+            <a:endParaRPr lang="en-US" altLang="zh-CN" b="1" dirty="0" smtClean="0">
+              <a:effectLst>
+                <a:outerShdw blurRad="38100" dist="38100" dir="2700000" algn="tl">
+                  <a:srgbClr val="000000">
+                    <a:alpha val="43137"/>
+                  </a:srgbClr>
+                </a:outerShdw>
+              </a:effectLst>
+            </a:endParaRPr>
+          </a:p>
+          <a:p>
+            <a:pPr algn="ctr"/>
+            <a:r>
+              <a:rPr lang="zh-CN" altLang="en-US" b="1" dirty="0" smtClean="0">
+                <a:effectLst>
+                  <a:outerShdw blurRad="38100" dist="38100" dir="2700000" algn="tl">
+                    <a:srgbClr val="000000">
+                      <a:alpha val="43137"/>
+                    </a:srgbClr>
+                  </a:outerShdw>
+                </a:effectLst>
+              </a:rPr>
+              <a:t>输</a:t>
+            </a:r>
+            <a:endParaRPr lang="en-US" altLang="zh-CN" b="1" dirty="0" smtClean="0">
+              <a:effectLst>
+                <a:outerShdw blurRad="38100" dist="38100" dir="2700000" algn="tl">
+                  <a:srgbClr val="000000">
+                    <a:alpha val="43137"/>
+                  </a:srgbClr>
+                </a:outerShdw>
+              </a:effectLst>
+            </a:endParaRPr>
+          </a:p>
+          <a:p>
+            <a:pPr algn="ctr"/>
+            <a:r>
+              <a:rPr lang="zh-CN" altLang="en-US" b="1" dirty="0" smtClean="0">
+                <a:effectLst>
+                  <a:outerShdw blurRad="38100" dist="38100" dir="2700000" algn="tl">
+                    <a:srgbClr val="000000">
+                      <a:alpha val="43137"/>
+                    </a:srgbClr>
+                  </a:outerShdw>
+                </a:effectLst>
+              </a:rPr>
+              <a:t>入</a:t>
+            </a:r>
+            <a:endParaRPr lang="zh-CN" altLang="en-US" b="1" dirty="0">
+              <a:effectLst>
+                <a:outerShdw blurRad="38100" dist="38100" dir="2700000" algn="tl">
+                  <a:srgbClr val="000000">
+                    <a:alpha val="43137"/>
+                  </a:srgbClr>
+                </a:outerShdw>
+              </a:effectLst>
+            </a:endParaRPr>
+          </a:p>
+        </p:txBody>
+      </p:sp>
+      <p:sp>
+        <p:nvSpPr>
+          <p:cNvPr id="8" name="圆角矩形 7"/>
+          <p:cNvSpPr/>
+          <p:nvPr/>
+        </p:nvSpPr>
+        <p:spPr>
+          <a:xfrm>
+            <a:off x="6156176" y="2492896"/>
+            <a:ext cx="1634732" cy="748691"/>
+          </a:xfrm>
+          <a:prstGeom prst="roundRect">
+            <a:avLst>
+              <a:gd name="adj" fmla="val 50000"/>
+            </a:avLst>
+          </a:prstGeom>
+        </p:spPr>
+        <p:style>
+          <a:lnRef idx="3">
+            <a:schemeClr val="lt1"/>
+          </a:lnRef>
+          <a:fillRef idx="1">
+            <a:schemeClr val="accent1"/>
+          </a:fillRef>
+          <a:effectRef idx="1">
+            <a:schemeClr val="accent1"/>
+          </a:effectRef>
+          <a:fontRef idx="minor">
+            <a:schemeClr val="lt1"/>
+          </a:fontRef>
+        </p:style>
+        <p:txBody>
+          <a:bodyPr rtlCol="0" anchor="ctr"/>
+          <a:lstStyle/>
+          <a:p>
+            <a:pPr algn="ctr"/>
+            <a:r>
+              <a:rPr lang="en-US" altLang="zh-CN" sz="2400" b="1" dirty="0" smtClean="0">
+                <a:effectLst>
+                  <a:outerShdw blurRad="38100" dist="38100" dir="2700000" algn="tl">
+                    <a:srgbClr val="000000">
+                      <a:alpha val="43137"/>
+                    </a:srgbClr>
+                  </a:outerShdw>
+                </a:effectLst>
+              </a:rPr>
+              <a:t>PCF8563</a:t>
+            </a:r>
+            <a:endParaRPr lang="zh-CN" altLang="en-US" sz="2400" b="1" dirty="0">
+              <a:effectLst>
+                <a:outerShdw blurRad="38100" dist="38100" dir="2700000" algn="tl">
+                  <a:srgbClr val="000000">
+                    <a:alpha val="43137"/>
+                  </a:srgbClr>
+                </a:outerShdw>
+              </a:effectLst>
+            </a:endParaRPr>
+          </a:p>
+        </p:txBody>
+      </p:sp>
+      <p:grpSp>
+        <p:nvGrpSpPr>
+          <p:cNvPr id="29" name="组合 28"/>
+          <p:cNvGrpSpPr/>
+          <p:nvPr/>
+        </p:nvGrpSpPr>
+        <p:grpSpPr>
+          <a:xfrm>
+            <a:off x="6196865" y="3639338"/>
+            <a:ext cx="776554" cy="948735"/>
+            <a:chOff x="3779912" y="5571207"/>
+            <a:chExt cx="288032" cy="666105"/>
+          </a:xfrm>
+        </p:grpSpPr>
+        <p:sp>
+          <p:nvSpPr>
+            <p:cNvPr id="9" name="矩形 8"/>
+            <p:cNvSpPr/>
+            <p:nvPr/>
+          </p:nvSpPr>
+          <p:spPr>
+            <a:xfrm>
+              <a:off x="3779912" y="5733256"/>
+              <a:ext cx="72008" cy="360040"/>
+            </a:xfrm>
+            <a:prstGeom prst="rect">
+              <a:avLst/>
+            </a:prstGeom>
+          </p:spPr>
+          <p:style>
+            <a:lnRef idx="2">
+              <a:schemeClr val="accent2">
+                <a:shade val="50000"/>
+              </a:schemeClr>
+            </a:lnRef>
+            <a:fillRef idx="1">
+              <a:schemeClr val="accent2"/>
+            </a:fillRef>
+            <a:effectRef idx="0">
+              <a:schemeClr val="accent2"/>
+            </a:effectRef>
+            <a:fontRef idx="minor">
+              <a:schemeClr val="lt1"/>
+            </a:fontRef>
+          </p:style>
+          <p:txBody>
+            <a:bodyPr rtlCol="0" anchor="ctr"/>
+            <a:lstStyle/>
+            <a:p>
+              <a:pPr algn="ctr"/>
+              <a:endParaRPr lang="zh-CN" altLang="en-US"/>
+            </a:p>
+          </p:txBody>
+        </p:sp>
+        <p:cxnSp>
+          <p:nvCxnSpPr>
+            <p:cNvPr id="12" name="直接连接符 11"/>
+            <p:cNvCxnSpPr/>
+            <p:nvPr/>
+          </p:nvCxnSpPr>
+          <p:spPr>
+            <a:xfrm flipV="1">
+              <a:off x="3851920" y="5571207"/>
+              <a:ext cx="216024" cy="162049"/>
+            </a:xfrm>
+            <a:prstGeom prst="line">
+              <a:avLst/>
+            </a:prstGeom>
+          </p:spPr>
+          <p:style>
+            <a:lnRef idx="2">
+              <a:schemeClr val="accent2"/>
+            </a:lnRef>
+            <a:fillRef idx="0">
+              <a:schemeClr val="accent2"/>
+            </a:fillRef>
+            <a:effectRef idx="1">
+              <a:schemeClr val="accent2"/>
+            </a:effectRef>
+            <a:fontRef idx="minor">
+              <a:schemeClr val="tx1"/>
+            </a:fontRef>
+          </p:style>
+        </p:cxnSp>
+        <p:cxnSp>
+          <p:nvCxnSpPr>
+            <p:cNvPr id="14" name="直接连接符 13"/>
+            <p:cNvCxnSpPr/>
+            <p:nvPr/>
+          </p:nvCxnSpPr>
+          <p:spPr>
+            <a:xfrm>
+              <a:off x="3851920" y="6093296"/>
+              <a:ext cx="216024" cy="144016"/>
+            </a:xfrm>
+            <a:prstGeom prst="line">
+              <a:avLst/>
+            </a:prstGeom>
+          </p:spPr>
+          <p:style>
+            <a:lnRef idx="2">
+              <a:schemeClr val="accent2"/>
+            </a:lnRef>
+            <a:fillRef idx="0">
+              <a:schemeClr val="accent2"/>
+            </a:fillRef>
+            <a:effectRef idx="1">
+              <a:schemeClr val="accent2"/>
+            </a:effectRef>
+            <a:fontRef idx="minor">
+              <a:schemeClr val="tx1"/>
+            </a:fontRef>
+          </p:style>
+        </p:cxnSp>
+        <p:cxnSp>
+          <p:nvCxnSpPr>
+            <p:cNvPr id="24" name="直接连接符 23"/>
+            <p:cNvCxnSpPr/>
+            <p:nvPr/>
+          </p:nvCxnSpPr>
+          <p:spPr>
+            <a:xfrm>
+              <a:off x="4067944" y="5571207"/>
+              <a:ext cx="0" cy="666105"/>
+            </a:xfrm>
+            <a:prstGeom prst="line">
+              <a:avLst/>
+            </a:prstGeom>
+          </p:spPr>
+          <p:style>
+            <a:lnRef idx="2">
+              <a:schemeClr val="accent2"/>
+            </a:lnRef>
+            <a:fillRef idx="0">
+              <a:schemeClr val="accent2"/>
+            </a:fillRef>
+            <a:effectRef idx="1">
+              <a:schemeClr val="accent2"/>
+            </a:effectRef>
+            <a:fontRef idx="minor">
+              <a:schemeClr val="tx1"/>
+            </a:fontRef>
+          </p:style>
+        </p:cxnSp>
+      </p:grpSp>
+      <p:sp>
+        <p:nvSpPr>
+          <p:cNvPr id="30" name="下箭头 29"/>
+          <p:cNvSpPr/>
+          <p:nvPr/>
+        </p:nvSpPr>
+        <p:spPr>
+          <a:xfrm flipV="1">
+            <a:off x="3671900" y="1700808"/>
+            <a:ext cx="576064" cy="769342"/>
+          </a:xfrm>
+          <a:prstGeom prst="downArrow">
+            <a:avLst/>
+          </a:prstGeom>
+        </p:spPr>
+        <p:style>
+          <a:lnRef idx="1">
+            <a:schemeClr val="accent2"/>
+          </a:lnRef>
+          <a:fillRef idx="2">
+            <a:schemeClr val="accent2"/>
+          </a:fillRef>
+          <a:effectRef idx="1">
+            <a:schemeClr val="accent2"/>
+          </a:effectRef>
+          <a:fontRef idx="minor">
+            <a:schemeClr val="dk1"/>
+          </a:fontRef>
+        </p:style>
+        <p:txBody>
+          <a:bodyPr rtlCol="0" anchor="ctr"/>
+          <a:lstStyle/>
+          <a:p>
+            <a:pPr algn="ctr"/>
+            <a:endParaRPr lang="zh-CN" altLang="en-US"/>
+          </a:p>
+        </p:txBody>
+      </p:sp>
+      <p:sp>
+        <p:nvSpPr>
+          <p:cNvPr id="31" name="右箭头 30"/>
+          <p:cNvSpPr/>
+          <p:nvPr/>
+        </p:nvSpPr>
+        <p:spPr>
+          <a:xfrm>
+            <a:off x="2032698" y="3148991"/>
+            <a:ext cx="811110" cy="355825"/>
+          </a:xfrm>
+          <a:prstGeom prst="rightArrow">
+            <a:avLst/>
+          </a:prstGeom>
+        </p:spPr>
+        <p:style>
+          <a:lnRef idx="1">
+            <a:schemeClr val="dk1"/>
+          </a:lnRef>
+          <a:fillRef idx="2">
+            <a:schemeClr val="dk1"/>
+          </a:fillRef>
+          <a:effectRef idx="1">
+            <a:schemeClr val="dk1"/>
+          </a:effectRef>
+          <a:fontRef idx="minor">
+            <a:schemeClr val="dk1"/>
+          </a:fontRef>
+        </p:style>
+        <p:txBody>
+          <a:bodyPr rtlCol="0" anchor="ctr"/>
+          <a:lstStyle/>
+          <a:p>
+            <a:pPr algn="ctr"/>
+            <a:endParaRPr lang="zh-CN" altLang="en-US"/>
+          </a:p>
+        </p:txBody>
+      </p:sp>
+      <p:sp>
+        <p:nvSpPr>
+          <p:cNvPr id="32" name="左右箭头 31"/>
+          <p:cNvSpPr/>
+          <p:nvPr/>
+        </p:nvSpPr>
+        <p:spPr>
+          <a:xfrm>
+            <a:off x="5292080" y="2712491"/>
+            <a:ext cx="904785" cy="284461"/>
+          </a:xfrm>
+          <a:prstGeom prst="leftRightArrow">
+            <a:avLst/>
+          </a:prstGeom>
+        </p:spPr>
+        <p:style>
+          <a:lnRef idx="1">
+            <a:schemeClr val="accent1"/>
+          </a:lnRef>
+          <a:fillRef idx="2">
+            <a:schemeClr val="accent1"/>
+          </a:fillRef>
+          <a:effectRef idx="1">
+            <a:schemeClr val="accent1"/>
+          </a:effectRef>
+          <a:fontRef idx="minor">
+            <a:schemeClr val="dk1"/>
+          </a:fontRef>
+        </p:style>
+        <p:txBody>
+          <a:bodyPr rtlCol="0" anchor="ctr"/>
+          <a:lstStyle/>
+          <a:p>
+            <a:pPr algn="ctr"/>
+            <a:endParaRPr lang="zh-CN" altLang="en-US"/>
+          </a:p>
+        </p:txBody>
+      </p:sp>
+      <p:sp>
+        <p:nvSpPr>
+          <p:cNvPr id="33" name="右箭头 32"/>
+          <p:cNvSpPr/>
+          <p:nvPr/>
+        </p:nvSpPr>
+        <p:spPr>
+          <a:xfrm>
+            <a:off x="5292080" y="3971297"/>
+            <a:ext cx="864096" cy="284819"/>
+          </a:xfrm>
+          <a:prstGeom prst="rightArrow">
+            <a:avLst/>
+          </a:prstGeom>
+        </p:spPr>
+        <p:style>
+          <a:lnRef idx="1">
+            <a:schemeClr val="accent2"/>
+          </a:lnRef>
+          <a:fillRef idx="2">
+            <a:schemeClr val="accent2"/>
+          </a:fillRef>
+          <a:effectRef idx="1">
+            <a:schemeClr val="accent2"/>
+          </a:effectRef>
+          <a:fontRef idx="minor">
+            <a:schemeClr val="dk1"/>
+          </a:fontRef>
+        </p:style>
+        <p:txBody>
+          <a:bodyPr rtlCol="0" anchor="ctr"/>
+          <a:lstStyle/>
+          <a:p>
+            <a:pPr algn="ctr"/>
+            <a:endParaRPr lang="zh-CN" altLang="en-US"/>
+          </a:p>
+        </p:txBody>
+      </p:sp>
+    </p:spTree>
+    <p:extLst>
+      <p:ext uri="{BB962C8B-B14F-4D97-AF65-F5344CB8AC3E}">
+        <p14:creationId xmlns:p14="http://schemas.microsoft.com/office/powerpoint/2010/main" val="3873972233"/>
+      </p:ext>
+    </p:extLst>
+  </p:cSld>
+  <p:clrMapOvr>
+    <a:masterClrMapping/>
+  </p:clrMapOvr>
+  <p:timing>
+    <p:tnLst>
+      <p:par>
+        <p:cTn id="1" dur="indefinite" restart="never" nodeType="tmRoot"/>
+      </p:par>
+    </p:tnLst>
+  </p:timing>
+</p:sld>
+</file>
+
+<file path=ppt/slides/slide7.xml><?xml version="1.0" encoding="utf-8"?>
+<p:sld xmlns:a="http://schemas.openxmlformats.org/drawingml/2006/main" xmlns:r="http://schemas.openxmlformats.org/officeDocument/2006/relationships" xmlns:p="http://schemas.openxmlformats.org/presentationml/2006/main">
+  <p:cSld>
+    <p:spTree>
+      <p:nvGrpSpPr>
+        <p:cNvPr id="1" name=""/>
+        <p:cNvGrpSpPr/>
+        <p:nvPr/>
+      </p:nvGrpSpPr>
+      <p:grpSpPr>
+        <a:xfrm>
+          <a:off x="0" y="0"/>
+          <a:ext cx="0" cy="0"/>
+          <a:chOff x="0" y="0"/>
+          <a:chExt cx="0" cy="0"/>
+        </a:xfrm>
+      </p:grpSpPr>
+      <p:sp>
+        <p:nvSpPr>
+          <p:cNvPr id="10" name="下箭头 9"/>
+          <p:cNvSpPr/>
+          <p:nvPr/>
+        </p:nvSpPr>
+        <p:spPr>
+          <a:xfrm>
+            <a:off x="4572000" y="3861048"/>
+            <a:ext cx="540060" cy="1213534"/>
+          </a:xfrm>
+          <a:prstGeom prst="downArrow">
+            <a:avLst/>
+          </a:prstGeom>
+        </p:spPr>
+        <p:style>
+          <a:lnRef idx="0">
+            <a:schemeClr val="accent6"/>
+          </a:lnRef>
+          <a:fillRef idx="3">
+            <a:schemeClr val="accent6"/>
+          </a:fillRef>
+          <a:effectRef idx="3">
+            <a:schemeClr val="accent6"/>
+          </a:effectRef>
+          <a:fontRef idx="minor">
+            <a:schemeClr val="lt1"/>
+          </a:fontRef>
+        </p:style>
+        <p:txBody>
+          <a:bodyPr rtlCol="0" anchor="ctr"/>
+          <a:lstStyle/>
+          <a:p>
+            <a:pPr algn="ctr"/>
+            <a:endParaRPr lang="zh-CN" altLang="en-US"/>
+          </a:p>
+        </p:txBody>
+      </p:sp>
+      <p:sp>
+        <p:nvSpPr>
+          <p:cNvPr id="4" name="圆角矩形 3"/>
+          <p:cNvSpPr/>
+          <p:nvPr/>
+        </p:nvSpPr>
+        <p:spPr>
+          <a:xfrm>
+            <a:off x="3779912" y="692696"/>
+            <a:ext cx="2088232" cy="864096"/>
+          </a:xfrm>
+          <a:prstGeom prst="roundRect">
+            <a:avLst>
+              <a:gd name="adj" fmla="val 50000"/>
+            </a:avLst>
+          </a:prstGeom>
+        </p:spPr>
+        <p:style>
+          <a:lnRef idx="1">
+            <a:schemeClr val="accent1"/>
+          </a:lnRef>
+          <a:fillRef idx="2">
+            <a:schemeClr val="accent1"/>
+          </a:fillRef>
+          <a:effectRef idx="1">
+            <a:schemeClr val="accent1"/>
+          </a:effectRef>
+          <a:fontRef idx="minor">
+            <a:schemeClr val="dk1"/>
+          </a:fontRef>
+        </p:style>
+        <p:txBody>
+          <a:bodyPr rtlCol="0" anchor="ctr"/>
+          <a:lstStyle/>
+          <a:p>
+            <a:pPr algn="ctr"/>
+            <a:r>
+              <a:rPr lang="en-US" altLang="zh-CN" sz="2000" b="1" dirty="0" smtClean="0">
+                <a:effectLst>
+                  <a:outerShdw blurRad="38100" dist="38100" dir="2700000" algn="tl">
+                    <a:srgbClr val="000000">
+                      <a:alpha val="43137"/>
+                    </a:srgbClr>
+                  </a:outerShdw>
+                </a:effectLst>
+                <a:latin typeface="Times New Roman" pitchFamily="18" charset="0"/>
+                <a:cs typeface="Times New Roman" pitchFamily="18" charset="0"/>
+              </a:rPr>
+              <a:t>Latex Template</a:t>
+            </a:r>
+            <a:endParaRPr lang="zh-CN" altLang="en-US" sz="2000" b="1" dirty="0">
+              <a:effectLst>
+                <a:outerShdw blurRad="38100" dist="38100" dir="2700000" algn="tl">
+                  <a:srgbClr val="000000">
+                    <a:alpha val="43137"/>
+                  </a:srgbClr>
+                </a:outerShdw>
+              </a:effectLst>
+              <a:latin typeface="Times New Roman" pitchFamily="18" charset="0"/>
+              <a:cs typeface="Times New Roman" pitchFamily="18" charset="0"/>
+            </a:endParaRPr>
+          </a:p>
+        </p:txBody>
+      </p:sp>
+      <p:sp>
+        <p:nvSpPr>
+          <p:cNvPr id="5" name="圆角矩形 4"/>
+          <p:cNvSpPr/>
+          <p:nvPr/>
+        </p:nvSpPr>
+        <p:spPr>
+          <a:xfrm>
+            <a:off x="395536" y="2564904"/>
+            <a:ext cx="2088232" cy="864096"/>
+          </a:xfrm>
+          <a:prstGeom prst="roundRect">
+            <a:avLst>
+              <a:gd name="adj" fmla="val 50000"/>
+            </a:avLst>
+          </a:prstGeom>
+        </p:spPr>
+        <p:style>
+          <a:lnRef idx="1">
+            <a:schemeClr val="accent1"/>
+          </a:lnRef>
+          <a:fillRef idx="2">
+            <a:schemeClr val="accent1"/>
+          </a:fillRef>
+          <a:effectRef idx="1">
+            <a:schemeClr val="accent1"/>
+          </a:effectRef>
+          <a:fontRef idx="minor">
+            <a:schemeClr val="dk1"/>
+          </a:fontRef>
+        </p:style>
+        <p:txBody>
+          <a:bodyPr rtlCol="0" anchor="ctr"/>
+          <a:lstStyle/>
+          <a:p>
+            <a:pPr algn="ctr"/>
+            <a:r>
+              <a:rPr lang="en-US" altLang="zh-CN" sz="2000" b="1" dirty="0" smtClean="0">
+                <a:effectLst>
+                  <a:outerShdw blurRad="38100" dist="38100" dir="2700000" algn="tl">
+                    <a:srgbClr val="000000">
+                      <a:alpha val="43137"/>
+                    </a:srgbClr>
+                  </a:outerShdw>
+                </a:effectLst>
+                <a:latin typeface="Times New Roman" pitchFamily="18" charset="0"/>
+                <a:cs typeface="Times New Roman" pitchFamily="18" charset="0"/>
+              </a:rPr>
+              <a:t>MARKDOWN</a:t>
+            </a:r>
+            <a:endParaRPr lang="zh-CN" altLang="en-US" sz="2000" b="1" dirty="0">
+              <a:effectLst>
+                <a:outerShdw blurRad="38100" dist="38100" dir="2700000" algn="tl">
+                  <a:srgbClr val="000000">
+                    <a:alpha val="43137"/>
+                  </a:srgbClr>
+                </a:outerShdw>
+              </a:effectLst>
+              <a:latin typeface="Times New Roman" pitchFamily="18" charset="0"/>
+              <a:cs typeface="Times New Roman" pitchFamily="18" charset="0"/>
+            </a:endParaRPr>
+          </a:p>
+        </p:txBody>
+      </p:sp>
+      <p:sp>
+        <p:nvSpPr>
+          <p:cNvPr id="6" name="圆角矩形 5"/>
+          <p:cNvSpPr/>
+          <p:nvPr/>
+        </p:nvSpPr>
+        <p:spPr>
+          <a:xfrm>
+            <a:off x="3835868" y="3007554"/>
+            <a:ext cx="2088232" cy="864096"/>
+          </a:xfrm>
+          <a:prstGeom prst="roundRect">
+            <a:avLst>
+              <a:gd name="adj" fmla="val 50000"/>
+            </a:avLst>
+          </a:prstGeom>
+        </p:spPr>
+        <p:style>
+          <a:lnRef idx="0">
+            <a:schemeClr val="accent6"/>
+          </a:lnRef>
+          <a:fillRef idx="3">
+            <a:schemeClr val="accent6"/>
+          </a:fillRef>
+          <a:effectRef idx="3">
+            <a:schemeClr val="accent6"/>
+          </a:effectRef>
+          <a:fontRef idx="minor">
+            <a:schemeClr val="lt1"/>
+          </a:fontRef>
+        </p:style>
+        <p:txBody>
+          <a:bodyPr rtlCol="0" anchor="ctr"/>
+          <a:lstStyle/>
+          <a:p>
+            <a:pPr algn="ctr"/>
+            <a:r>
+              <a:rPr lang="en-US" altLang="zh-CN" sz="2000" b="1" dirty="0" smtClean="0">
+                <a:solidFill>
+                  <a:schemeClr val="tx1"/>
+                </a:solidFill>
+                <a:effectLst>
+                  <a:outerShdw blurRad="38100" dist="38100" dir="2700000" algn="tl">
+                    <a:srgbClr val="000000">
+                      <a:alpha val="43137"/>
+                    </a:srgbClr>
+                  </a:outerShdw>
+                </a:effectLst>
+                <a:latin typeface="Times New Roman" pitchFamily="18" charset="0"/>
+                <a:cs typeface="Times New Roman" pitchFamily="18" charset="0"/>
+              </a:rPr>
+              <a:t>LATEX</a:t>
+            </a:r>
+            <a:endParaRPr lang="zh-CN" altLang="en-US" sz="2000" b="1" dirty="0">
+              <a:solidFill>
+                <a:schemeClr val="tx1"/>
+              </a:solidFill>
+              <a:effectLst>
+                <a:outerShdw blurRad="38100" dist="38100" dir="2700000" algn="tl">
+                  <a:srgbClr val="000000">
+                    <a:alpha val="43137"/>
+                  </a:srgbClr>
+                </a:outerShdw>
+              </a:effectLst>
+              <a:latin typeface="Times New Roman" pitchFamily="18" charset="0"/>
+              <a:cs typeface="Times New Roman" pitchFamily="18" charset="0"/>
+            </a:endParaRPr>
+          </a:p>
+        </p:txBody>
+      </p:sp>
+      <p:sp>
+        <p:nvSpPr>
+          <p:cNvPr id="7" name="圆角矩形 6"/>
+          <p:cNvSpPr/>
+          <p:nvPr/>
+        </p:nvSpPr>
+        <p:spPr>
+          <a:xfrm>
+            <a:off x="3835868" y="5085184"/>
+            <a:ext cx="2088232" cy="864096"/>
+          </a:xfrm>
+          <a:prstGeom prst="roundRect">
+            <a:avLst/>
+          </a:prstGeom>
+        </p:spPr>
+        <p:style>
+          <a:lnRef idx="0">
+            <a:schemeClr val="accent5"/>
+          </a:lnRef>
+          <a:fillRef idx="3">
+            <a:schemeClr val="accent5"/>
+          </a:fillRef>
+          <a:effectRef idx="3">
+            <a:schemeClr val="accent5"/>
+          </a:effectRef>
+          <a:fontRef idx="minor">
+            <a:schemeClr val="lt1"/>
+          </a:fontRef>
+        </p:style>
+        <p:txBody>
+          <a:bodyPr rtlCol="0" anchor="ctr"/>
+          <a:lstStyle/>
+          <a:p>
+            <a:pPr algn="ctr"/>
+            <a:r>
+              <a:rPr lang="en-US" altLang="zh-CN" sz="2000" b="1" dirty="0" smtClean="0">
+                <a:solidFill>
+                  <a:schemeClr val="tx1"/>
+                </a:solidFill>
+                <a:effectLst>
+                  <a:outerShdw blurRad="38100" dist="38100" dir="2700000" algn="tl">
+                    <a:srgbClr val="000000">
+                      <a:alpha val="43137"/>
+                    </a:srgbClr>
+                  </a:outerShdw>
+                </a:effectLst>
+                <a:latin typeface="Times New Roman" pitchFamily="18" charset="0"/>
+                <a:cs typeface="Times New Roman" pitchFamily="18" charset="0"/>
+              </a:rPr>
+              <a:t>PDF</a:t>
+            </a:r>
+            <a:endParaRPr lang="zh-CN" altLang="en-US" sz="2000" b="1" dirty="0">
+              <a:solidFill>
+                <a:schemeClr val="tx1"/>
+              </a:solidFill>
+              <a:effectLst>
+                <a:outerShdw blurRad="38100" dist="38100" dir="2700000" algn="tl">
+                  <a:srgbClr val="000000">
+                    <a:alpha val="43137"/>
+                  </a:srgbClr>
+                </a:outerShdw>
+              </a:effectLst>
+              <a:latin typeface="Times New Roman" pitchFamily="18" charset="0"/>
+              <a:cs typeface="Times New Roman" pitchFamily="18" charset="0"/>
+            </a:endParaRPr>
+          </a:p>
+        </p:txBody>
+      </p:sp>
+      <p:sp>
+        <p:nvSpPr>
+          <p:cNvPr id="8" name="下箭头 7"/>
+          <p:cNvSpPr/>
+          <p:nvPr/>
+        </p:nvSpPr>
+        <p:spPr>
+          <a:xfrm>
+            <a:off x="4644008" y="1622354"/>
+            <a:ext cx="432048" cy="1374598"/>
+          </a:xfrm>
+          <a:prstGeom prst="downArrow">
+            <a:avLst/>
+          </a:prstGeom>
+        </p:spPr>
+        <p:style>
+          <a:lnRef idx="1">
+            <a:schemeClr val="accent1"/>
+          </a:lnRef>
+          <a:fillRef idx="2">
+            <a:schemeClr val="accent1"/>
+          </a:fillRef>
+          <a:effectRef idx="1">
+            <a:schemeClr val="accent1"/>
+          </a:effectRef>
+          <a:fontRef idx="minor">
+            <a:schemeClr val="dk1"/>
+          </a:fontRef>
+        </p:style>
+        <p:txBody>
+          <a:bodyPr rtlCol="0" anchor="ctr"/>
+          <a:lstStyle/>
+          <a:p>
+            <a:pPr algn="ctr"/>
+            <a:endParaRPr lang="zh-CN" altLang="en-US"/>
+          </a:p>
+        </p:txBody>
+      </p:sp>
+      <p:sp>
+        <p:nvSpPr>
+          <p:cNvPr id="9" name="右箭头 8"/>
+          <p:cNvSpPr/>
+          <p:nvPr/>
+        </p:nvSpPr>
+        <p:spPr>
+          <a:xfrm rot="667350">
+            <a:off x="2506714" y="3106547"/>
+            <a:ext cx="1311521" cy="310511"/>
+          </a:xfrm>
+          <a:prstGeom prst="rightArrow">
+            <a:avLst/>
+          </a:prstGeom>
+        </p:spPr>
+        <p:style>
+          <a:lnRef idx="1">
+            <a:schemeClr val="accent1"/>
+          </a:lnRef>
+          <a:fillRef idx="2">
+            <a:schemeClr val="accent1"/>
+          </a:fillRef>
+          <a:effectRef idx="1">
+            <a:schemeClr val="accent1"/>
+          </a:effectRef>
+          <a:fontRef idx="minor">
+            <a:schemeClr val="dk1"/>
+          </a:fontRef>
+        </p:style>
+        <p:txBody>
+          <a:bodyPr rtlCol="0" anchor="ctr"/>
+          <a:lstStyle/>
+          <a:p>
+            <a:pPr algn="ctr"/>
+            <a:endParaRPr lang="zh-CN" altLang="en-US"/>
+          </a:p>
+        </p:txBody>
+      </p:sp>
+    </p:spTree>
+    <p:extLst>
+      <p:ext uri="{BB962C8B-B14F-4D97-AF65-F5344CB8AC3E}">
+        <p14:creationId xmlns:p14="http://schemas.microsoft.com/office/powerpoint/2010/main" val="2134057152"/>
       </p:ext>
     </p:extLst>
   </p:cSld>

</xml_diff>